<commit_message>
Commit 4 - 2-18/06/11
</commit_message>
<xml_diff>
--- a/Results/FamilialBlood/RhoDiagram.pptx
+++ b/Results/FamilialBlood/RhoDiagram.pptx
@@ -6,6 +6,7 @@
   </p:sldMasterIdLst>
   <p:sldIdLst>
     <p:sldId id="256" r:id="rId2"/>
+    <p:sldId id="257" r:id="rId3"/>
   </p:sldIdLst>
   <p:sldSz cx="11520488" cy="10799763"/>
   <p:notesSz cx="6858000" cy="9144000"/>
@@ -104,6 +105,11 @@
       </a:defRPr>
     </a:lvl9pPr>
   </p:defaultTextStyle>
+  <p:extLst>
+    <p:ext uri="{EFAFB233-063F-42B5-8137-9DF3F51BA10A}">
+      <p15:sldGuideLst xmlns:p15="http://schemas.microsoft.com/office/powerpoint/2012/main"/>
+    </p:ext>
+  </p:extLst>
 </p:presentation>
 </file>
 
@@ -238,7 +244,7 @@
           <a:p>
             <a:fld id="{079D7AC3-23CA-0745-81D5-857BBA72BC43}" type="datetimeFigureOut">
               <a:rPr lang="en-US" smtClean="0"/>
-              <a:t>6/4/18</a:t>
+              <a:t>6/11/18</a:t>
             </a:fld>
             <a:endParaRPr lang="en-US"/>
           </a:p>
@@ -408,7 +414,7 @@
           <a:p>
             <a:fld id="{079D7AC3-23CA-0745-81D5-857BBA72BC43}" type="datetimeFigureOut">
               <a:rPr lang="en-US" smtClean="0"/>
-              <a:t>6/4/18</a:t>
+              <a:t>6/11/18</a:t>
             </a:fld>
             <a:endParaRPr lang="en-US"/>
           </a:p>
@@ -588,7 +594,7 @@
           <a:p>
             <a:fld id="{079D7AC3-23CA-0745-81D5-857BBA72BC43}" type="datetimeFigureOut">
               <a:rPr lang="en-US" smtClean="0"/>
-              <a:t>6/4/18</a:t>
+              <a:t>6/11/18</a:t>
             </a:fld>
             <a:endParaRPr lang="en-US"/>
           </a:p>
@@ -758,7 +764,7 @@
           <a:p>
             <a:fld id="{079D7AC3-23CA-0745-81D5-857BBA72BC43}" type="datetimeFigureOut">
               <a:rPr lang="en-US" smtClean="0"/>
-              <a:t>6/4/18</a:t>
+              <a:t>6/11/18</a:t>
             </a:fld>
             <a:endParaRPr lang="en-US"/>
           </a:p>
@@ -1002,7 +1008,7 @@
           <a:p>
             <a:fld id="{079D7AC3-23CA-0745-81D5-857BBA72BC43}" type="datetimeFigureOut">
               <a:rPr lang="en-US" smtClean="0"/>
-              <a:t>6/4/18</a:t>
+              <a:t>6/11/18</a:t>
             </a:fld>
             <a:endParaRPr lang="en-US"/>
           </a:p>
@@ -1234,7 +1240,7 @@
           <a:p>
             <a:fld id="{079D7AC3-23CA-0745-81D5-857BBA72BC43}" type="datetimeFigureOut">
               <a:rPr lang="en-US" smtClean="0"/>
-              <a:t>6/4/18</a:t>
+              <a:t>6/11/18</a:t>
             </a:fld>
             <a:endParaRPr lang="en-US"/>
           </a:p>
@@ -1601,7 +1607,7 @@
           <a:p>
             <a:fld id="{079D7AC3-23CA-0745-81D5-857BBA72BC43}" type="datetimeFigureOut">
               <a:rPr lang="en-US" smtClean="0"/>
-              <a:t>6/4/18</a:t>
+              <a:t>6/11/18</a:t>
             </a:fld>
             <a:endParaRPr lang="en-US"/>
           </a:p>
@@ -1719,7 +1725,7 @@
           <a:p>
             <a:fld id="{079D7AC3-23CA-0745-81D5-857BBA72BC43}" type="datetimeFigureOut">
               <a:rPr lang="en-US" smtClean="0"/>
-              <a:t>6/4/18</a:t>
+              <a:t>6/11/18</a:t>
             </a:fld>
             <a:endParaRPr lang="en-US"/>
           </a:p>
@@ -1814,7 +1820,7 @@
           <a:p>
             <a:fld id="{079D7AC3-23CA-0745-81D5-857BBA72BC43}" type="datetimeFigureOut">
               <a:rPr lang="en-US" smtClean="0"/>
-              <a:t>6/4/18</a:t>
+              <a:t>6/11/18</a:t>
             </a:fld>
             <a:endParaRPr lang="en-US"/>
           </a:p>
@@ -2091,7 +2097,7 @@
           <a:p>
             <a:fld id="{079D7AC3-23CA-0745-81D5-857BBA72BC43}" type="datetimeFigureOut">
               <a:rPr lang="en-US" smtClean="0"/>
-              <a:t>6/4/18</a:t>
+              <a:t>6/11/18</a:t>
             </a:fld>
             <a:endParaRPr lang="en-US"/>
           </a:p>
@@ -2348,7 +2354,7 @@
           <a:p>
             <a:fld id="{079D7AC3-23CA-0745-81D5-857BBA72BC43}" type="datetimeFigureOut">
               <a:rPr lang="en-US" smtClean="0"/>
-              <a:t>6/4/18</a:t>
+              <a:t>6/11/18</a:t>
             </a:fld>
             <a:endParaRPr lang="en-US"/>
           </a:p>
@@ -2561,7 +2567,7 @@
           <a:p>
             <a:fld id="{079D7AC3-23CA-0745-81D5-857BBA72BC43}" type="datetimeFigureOut">
               <a:rPr lang="en-US" smtClean="0"/>
-              <a:t>6/4/18</a:t>
+              <a:t>6/11/18</a:t>
             </a:fld>
             <a:endParaRPr lang="en-US"/>
           </a:p>
@@ -3249,6 +3255,306 @@
 </p:sld>
 </file>
 
+<file path=ppt/slides/slide2.xml><?xml version="1.0" encoding="utf-8"?>
+<p:sld xmlns:a="http://schemas.openxmlformats.org/drawingml/2006/main" xmlns:r="http://schemas.openxmlformats.org/officeDocument/2006/relationships" xmlns:p="http://schemas.openxmlformats.org/presentationml/2006/main">
+  <p:cSld>
+    <p:spTree>
+      <p:nvGrpSpPr>
+        <p:cNvPr id="1" name=""/>
+        <p:cNvGrpSpPr/>
+        <p:nvPr/>
+      </p:nvGrpSpPr>
+      <p:grpSpPr>
+        <a:xfrm>
+          <a:off x="0" y="0"/>
+          <a:ext cx="0" cy="0"/>
+          <a:chOff x="0" y="0"/>
+          <a:chExt cx="0" cy="0"/>
+        </a:xfrm>
+      </p:grpSpPr>
+      <p:pic>
+        <p:nvPicPr>
+          <p:cNvPr id="5" name="Picture 4">
+            <a:extLst>
+              <a:ext uri="{FF2B5EF4-FFF2-40B4-BE49-F238E27FC236}">
+                <a16:creationId xmlns:a16="http://schemas.microsoft.com/office/drawing/2014/main" id="{EEEE08E9-E96F-D14A-8642-26DB7685940E}"/>
+              </a:ext>
+            </a:extLst>
+          </p:cNvPr>
+          <p:cNvPicPr>
+            <a:picLocks noChangeAspect="1"/>
+          </p:cNvPicPr>
+          <p:nvPr/>
+        </p:nvPicPr>
+        <p:blipFill>
+          <a:blip r:embed="rId2"/>
+          <a:stretch>
+            <a:fillRect/>
+          </a:stretch>
+        </p:blipFill>
+        <p:spPr>
+          <a:xfrm>
+            <a:off x="670558" y="645667"/>
+            <a:ext cx="3504409" cy="2880000"/>
+          </a:xfrm>
+          <a:prstGeom prst="rect">
+            <a:avLst/>
+          </a:prstGeom>
+        </p:spPr>
+      </p:pic>
+      <p:pic>
+        <p:nvPicPr>
+          <p:cNvPr id="9" name="Picture 8">
+            <a:extLst>
+              <a:ext uri="{FF2B5EF4-FFF2-40B4-BE49-F238E27FC236}">
+                <a16:creationId xmlns:a16="http://schemas.microsoft.com/office/drawing/2014/main" id="{54B31B58-491E-0C46-BD5B-459172462705}"/>
+              </a:ext>
+            </a:extLst>
+          </p:cNvPr>
+          <p:cNvPicPr>
+            <a:picLocks noChangeAspect="1"/>
+          </p:cNvPicPr>
+          <p:nvPr/>
+        </p:nvPicPr>
+        <p:blipFill>
+          <a:blip r:embed="rId3"/>
+          <a:stretch>
+            <a:fillRect/>
+          </a:stretch>
+        </p:blipFill>
+        <p:spPr>
+          <a:xfrm>
+            <a:off x="4174969" y="645667"/>
+            <a:ext cx="3504409" cy="2880000"/>
+          </a:xfrm>
+          <a:prstGeom prst="rect">
+            <a:avLst/>
+          </a:prstGeom>
+        </p:spPr>
+      </p:pic>
+      <p:pic>
+        <p:nvPicPr>
+          <p:cNvPr id="11" name="Picture 10">
+            <a:extLst>
+              <a:ext uri="{FF2B5EF4-FFF2-40B4-BE49-F238E27FC236}">
+                <a16:creationId xmlns:a16="http://schemas.microsoft.com/office/drawing/2014/main" id="{D4DC97EA-47A7-DB49-A35C-FBC74B839767}"/>
+              </a:ext>
+            </a:extLst>
+          </p:cNvPr>
+          <p:cNvPicPr>
+            <a:picLocks noChangeAspect="1"/>
+          </p:cNvPicPr>
+          <p:nvPr/>
+        </p:nvPicPr>
+        <p:blipFill>
+          <a:blip r:embed="rId4"/>
+          <a:stretch>
+            <a:fillRect/>
+          </a:stretch>
+        </p:blipFill>
+        <p:spPr>
+          <a:xfrm>
+            <a:off x="7679377" y="645667"/>
+            <a:ext cx="3504409" cy="2880000"/>
+          </a:xfrm>
+          <a:prstGeom prst="rect">
+            <a:avLst/>
+          </a:prstGeom>
+        </p:spPr>
+      </p:pic>
+      <p:pic>
+        <p:nvPicPr>
+          <p:cNvPr id="13" name="Picture 12">
+            <a:extLst>
+              <a:ext uri="{FF2B5EF4-FFF2-40B4-BE49-F238E27FC236}">
+                <a16:creationId xmlns:a16="http://schemas.microsoft.com/office/drawing/2014/main" id="{B956DDFB-32A8-2046-977E-6909CE85363E}"/>
+              </a:ext>
+            </a:extLst>
+          </p:cNvPr>
+          <p:cNvPicPr>
+            <a:picLocks noChangeAspect="1"/>
+          </p:cNvPicPr>
+          <p:nvPr/>
+        </p:nvPicPr>
+        <p:blipFill>
+          <a:blip r:embed="rId5"/>
+          <a:stretch>
+            <a:fillRect/>
+          </a:stretch>
+        </p:blipFill>
+        <p:spPr>
+          <a:xfrm>
+            <a:off x="670557" y="4066793"/>
+            <a:ext cx="3504409" cy="2880000"/>
+          </a:xfrm>
+          <a:prstGeom prst="rect">
+            <a:avLst/>
+          </a:prstGeom>
+        </p:spPr>
+      </p:pic>
+      <p:pic>
+        <p:nvPicPr>
+          <p:cNvPr id="15" name="Picture 14">
+            <a:extLst>
+              <a:ext uri="{FF2B5EF4-FFF2-40B4-BE49-F238E27FC236}">
+                <a16:creationId xmlns:a16="http://schemas.microsoft.com/office/drawing/2014/main" id="{9C7996F3-C94C-ED4D-A405-D3E6EF74C185}"/>
+              </a:ext>
+            </a:extLst>
+          </p:cNvPr>
+          <p:cNvPicPr>
+            <a:picLocks noChangeAspect="1"/>
+          </p:cNvPicPr>
+          <p:nvPr/>
+        </p:nvPicPr>
+        <p:blipFill>
+          <a:blip r:embed="rId6"/>
+          <a:stretch>
+            <a:fillRect/>
+          </a:stretch>
+        </p:blipFill>
+        <p:spPr>
+          <a:xfrm>
+            <a:off x="4174968" y="4066793"/>
+            <a:ext cx="3504409" cy="2880000"/>
+          </a:xfrm>
+          <a:prstGeom prst="rect">
+            <a:avLst/>
+          </a:prstGeom>
+        </p:spPr>
+      </p:pic>
+      <p:pic>
+        <p:nvPicPr>
+          <p:cNvPr id="17" name="Picture 16">
+            <a:extLst>
+              <a:ext uri="{FF2B5EF4-FFF2-40B4-BE49-F238E27FC236}">
+                <a16:creationId xmlns:a16="http://schemas.microsoft.com/office/drawing/2014/main" id="{1F09644F-258C-C047-B76F-6EC50524EB57}"/>
+              </a:ext>
+            </a:extLst>
+          </p:cNvPr>
+          <p:cNvPicPr>
+            <a:picLocks noChangeAspect="1"/>
+          </p:cNvPicPr>
+          <p:nvPr/>
+        </p:nvPicPr>
+        <p:blipFill>
+          <a:blip r:embed="rId7"/>
+          <a:stretch>
+            <a:fillRect/>
+          </a:stretch>
+        </p:blipFill>
+        <p:spPr>
+          <a:xfrm>
+            <a:off x="7679376" y="4066793"/>
+            <a:ext cx="3504409" cy="2880000"/>
+          </a:xfrm>
+          <a:prstGeom prst="rect">
+            <a:avLst/>
+          </a:prstGeom>
+        </p:spPr>
+      </p:pic>
+      <p:pic>
+        <p:nvPicPr>
+          <p:cNvPr id="19" name="Picture 18">
+            <a:extLst>
+              <a:ext uri="{FF2B5EF4-FFF2-40B4-BE49-F238E27FC236}">
+                <a16:creationId xmlns:a16="http://schemas.microsoft.com/office/drawing/2014/main" id="{3C6FEE5F-3EB7-FE47-949C-2BEA1C9B436A}"/>
+              </a:ext>
+            </a:extLst>
+          </p:cNvPr>
+          <p:cNvPicPr>
+            <a:picLocks noChangeAspect="1"/>
+          </p:cNvPicPr>
+          <p:nvPr/>
+        </p:nvPicPr>
+        <p:blipFill>
+          <a:blip r:embed="rId8"/>
+          <a:stretch>
+            <a:fillRect/>
+          </a:stretch>
+        </p:blipFill>
+        <p:spPr>
+          <a:xfrm>
+            <a:off x="670559" y="7539733"/>
+            <a:ext cx="3504409" cy="2880000"/>
+          </a:xfrm>
+          <a:prstGeom prst="rect">
+            <a:avLst/>
+          </a:prstGeom>
+        </p:spPr>
+      </p:pic>
+      <p:pic>
+        <p:nvPicPr>
+          <p:cNvPr id="21" name="Picture 20">
+            <a:extLst>
+              <a:ext uri="{FF2B5EF4-FFF2-40B4-BE49-F238E27FC236}">
+                <a16:creationId xmlns:a16="http://schemas.microsoft.com/office/drawing/2014/main" id="{318C49FF-C72B-A34E-8FA1-46E3484DB01F}"/>
+              </a:ext>
+            </a:extLst>
+          </p:cNvPr>
+          <p:cNvPicPr>
+            <a:picLocks noChangeAspect="1"/>
+          </p:cNvPicPr>
+          <p:nvPr/>
+        </p:nvPicPr>
+        <p:blipFill>
+          <a:blip r:embed="rId9"/>
+          <a:stretch>
+            <a:fillRect/>
+          </a:stretch>
+        </p:blipFill>
+        <p:spPr>
+          <a:xfrm>
+            <a:off x="4174967" y="7539733"/>
+            <a:ext cx="3504409" cy="2880000"/>
+          </a:xfrm>
+          <a:prstGeom prst="rect">
+            <a:avLst/>
+          </a:prstGeom>
+        </p:spPr>
+      </p:pic>
+      <p:pic>
+        <p:nvPicPr>
+          <p:cNvPr id="23" name="Picture 22">
+            <a:extLst>
+              <a:ext uri="{FF2B5EF4-FFF2-40B4-BE49-F238E27FC236}">
+                <a16:creationId xmlns:a16="http://schemas.microsoft.com/office/drawing/2014/main" id="{F639085A-8D68-ED4C-A8A4-8212715E6B5B}"/>
+              </a:ext>
+            </a:extLst>
+          </p:cNvPr>
+          <p:cNvPicPr>
+            <a:picLocks noChangeAspect="1"/>
+          </p:cNvPicPr>
+          <p:nvPr/>
+        </p:nvPicPr>
+        <p:blipFill>
+          <a:blip r:embed="rId10"/>
+          <a:stretch>
+            <a:fillRect/>
+          </a:stretch>
+        </p:blipFill>
+        <p:spPr>
+          <a:xfrm>
+            <a:off x="7679376" y="7540568"/>
+            <a:ext cx="3504409" cy="2880000"/>
+          </a:xfrm>
+          <a:prstGeom prst="rect">
+            <a:avLst/>
+          </a:prstGeom>
+        </p:spPr>
+      </p:pic>
+    </p:spTree>
+    <p:extLst>
+      <p:ext uri="{BB962C8B-B14F-4D97-AF65-F5344CB8AC3E}">
+        <p14:creationId xmlns:p14="http://schemas.microsoft.com/office/powerpoint/2010/main" val="502126008"/>
+      </p:ext>
+    </p:extLst>
+  </p:cSld>
+  <p:clrMapOvr>
+    <a:masterClrMapping/>
+  </p:clrMapOvr>
+</p:sld>
+</file>
+
 <file path=ppt/theme/theme1.xml><?xml version="1.0" encoding="utf-8"?>
 <a:theme xmlns:a="http://schemas.openxmlformats.org/drawingml/2006/main" name="Office Theme">
   <a:themeElements>

</xml_diff>